<commit_message>
- Updated thesis tex files. FYI, I use 'LED editor' to compile my latex files. - Added pdf of thesis and also the unofficial guide which describes how to run simulations. - Updated the Quartus Archived project to latest. - Updated random test case for stress testing of MMU and Cache. - Added new driver file for testing the standalone DDR2 along with the DDR2 memory wrapepr.
</commit_message>
<xml_diff>
--- a/doc/gatech-thesis-1.8/myfigures/files_organization.pptx
+++ b/doc/gatech-thesis-1.8/myfigures/files_organization.pptx
@@ -3037,16 +3037,16 @@
       </p:grpSpPr>
       <p:sp>
         <p:nvSpPr>
-          <p:cNvPr id="4" name="Rectangle 3"/>
+          <p:cNvPr id="4" name="Rounded Rectangle 3"/>
           <p:cNvSpPr/>
           <p:nvPr/>
         </p:nvSpPr>
         <p:spPr>
           <a:xfrm>
-            <a:off x="152400" y="228600"/>
-            <a:ext cx="7772400" cy="6096000"/>
+            <a:off x="0" y="152400"/>
+            <a:ext cx="7924800" cy="6324600"/>
           </a:xfrm>
-          <a:prstGeom prst="rect">
+          <a:prstGeom prst="roundRect">
             <a:avLst/>
           </a:prstGeom>
         </p:spPr>
@@ -3084,7 +3084,7 @@
         </p:nvSpPr>
         <p:spPr>
           <a:xfrm>
-            <a:off x="8382000" y="1219200"/>
+            <a:off x="8534400" y="1524000"/>
             <a:ext cx="514350" cy="1295400"/>
           </a:xfrm>
           <a:prstGeom prst="roundRect">
@@ -3126,7 +3126,7 @@
         </p:nvSpPr>
         <p:spPr>
           <a:xfrm>
-            <a:off x="838200" y="609600"/>
+            <a:off x="990600" y="914400"/>
             <a:ext cx="5867400" cy="4495800"/>
           </a:xfrm>
           <a:prstGeom prst="roundRect">
@@ -3178,7 +3178,7 @@
         </p:nvSpPr>
         <p:spPr>
           <a:xfrm>
-            <a:off x="381000" y="5181600"/>
+            <a:off x="1828800" y="5791200"/>
             <a:ext cx="1295400" cy="381000"/>
           </a:xfrm>
           <a:prstGeom prst="roundRect">
@@ -3221,17 +3221,14 @@
         </p:nvSpPr>
         <p:spPr>
           <a:xfrm>
-            <a:off x="3657600" y="1371600"/>
+            <a:off x="3810000" y="1676400"/>
             <a:ext cx="2209800" cy="990600"/>
           </a:xfrm>
           <a:prstGeom prst="roundRect">
             <a:avLst/>
           </a:prstGeom>
           <a:solidFill>
-            <a:schemeClr val="accent1">
-              <a:lumMod val="60000"/>
-              <a:lumOff val="40000"/>
-            </a:schemeClr>
+            <a:schemeClr val="bg2"/>
           </a:solidFill>
         </p:spPr>
         <p:style>
@@ -3258,14 +3255,14 @@
             <a:r>
               <a:rPr lang="en-US" sz="1200" dirty="0" smtClean="0">
                 <a:solidFill>
-                  <a:srgbClr val="FFC000"/>
+                  <a:schemeClr val="tx2"/>
                 </a:solidFill>
               </a:rPr>
               <a:t>ddr2_ctrl_test ()</a:t>
             </a:r>
             <a:endParaRPr lang="en-US" sz="1200" dirty="0">
               <a:solidFill>
-                <a:srgbClr val="FFC000"/>
+                <a:schemeClr val="tx2"/>
               </a:solidFill>
             </a:endParaRPr>
           </a:p>
@@ -3323,7 +3320,7 @@
         </p:nvSpPr>
         <p:spPr>
           <a:xfrm>
-            <a:off x="990600" y="2590800"/>
+            <a:off x="1143000" y="2895600"/>
             <a:ext cx="5638800" cy="2286000"/>
           </a:xfrm>
           <a:prstGeom prst="roundRect">
@@ -3360,7 +3357,7 @@
             <a:r>
               <a:rPr lang="en-US" sz="1200" b="1" dirty="0" smtClean="0">
                 <a:solidFill>
-                  <a:srgbClr val="FFC000"/>
+                  <a:schemeClr val="tx1"/>
                 </a:solidFill>
               </a:rPr>
               <a:t>(ddr2_ctrl_test_example_sim_e0_d0</a:t>
@@ -3368,14 +3365,14 @@
             <a:r>
               <a:rPr lang="en-US" sz="1200" dirty="0" smtClean="0">
                 <a:solidFill>
-                  <a:srgbClr val="FFC000"/>
+                  <a:schemeClr val="tx1"/>
                 </a:solidFill>
               </a:rPr>
               <a:t>) ddr2_ctrl_test_example_sim_e0_d0.v</a:t>
             </a:r>
             <a:endParaRPr lang="en-US" sz="1200" dirty="0">
               <a:solidFill>
-                <a:srgbClr val="FFC000"/>
+                <a:schemeClr val="tx1"/>
               </a:solidFill>
             </a:endParaRPr>
           </a:p>
@@ -3392,7 +3389,7 @@
         </p:nvCxnSpPr>
         <p:spPr>
           <a:xfrm>
-            <a:off x="5867400" y="1866900"/>
+            <a:off x="6019800" y="2171700"/>
             <a:ext cx="2514600" cy="0"/>
           </a:xfrm>
           <a:prstGeom prst="straightConnector1">
@@ -3425,7 +3422,7 @@
         </p:nvSpPr>
         <p:spPr>
           <a:xfrm>
-            <a:off x="1219200" y="3048000"/>
+            <a:off x="1371600" y="3352800"/>
             <a:ext cx="1828800" cy="838200"/>
           </a:xfrm>
           <a:prstGeom prst="roundRect">
@@ -3483,17 +3480,14 @@
         </p:nvSpPr>
         <p:spPr>
           <a:xfrm>
-            <a:off x="1371600" y="1524000"/>
+            <a:off x="1524000" y="1828800"/>
             <a:ext cx="1524000" cy="381000"/>
           </a:xfrm>
           <a:prstGeom prst="roundRect">
             <a:avLst/>
           </a:prstGeom>
           <a:solidFill>
-            <a:schemeClr val="accent1">
-              <a:lumMod val="60000"/>
-              <a:lumOff val="40000"/>
-            </a:schemeClr>
+            <a:schemeClr val="bg2"/>
           </a:solidFill>
         </p:spPr>
         <p:style>
@@ -3520,14 +3514,14 @@
             <a:r>
               <a:rPr lang="en-US" sz="1200" dirty="0" smtClean="0">
                 <a:solidFill>
-                  <a:srgbClr val="FFC000"/>
+                  <a:schemeClr val="tx2"/>
                 </a:solidFill>
               </a:rPr>
               <a:t>Master translator</a:t>
             </a:r>
             <a:endParaRPr lang="en-US" sz="1200" dirty="0">
               <a:solidFill>
-                <a:srgbClr val="FFC000"/>
+                <a:schemeClr val="tx2"/>
               </a:solidFill>
             </a:endParaRPr>
           </a:p>
@@ -3541,17 +3535,14 @@
         </p:nvSpPr>
         <p:spPr>
           <a:xfrm>
-            <a:off x="1371600" y="1905000"/>
+            <a:off x="1524000" y="2209800"/>
             <a:ext cx="1524000" cy="381000"/>
           </a:xfrm>
           <a:prstGeom prst="roundRect">
             <a:avLst/>
           </a:prstGeom>
           <a:solidFill>
-            <a:schemeClr val="accent1">
-              <a:lumMod val="60000"/>
-              <a:lumOff val="40000"/>
-            </a:schemeClr>
+            <a:schemeClr val="bg2"/>
           </a:solidFill>
         </p:spPr>
         <p:style>
@@ -3578,14 +3569,14 @@
             <a:r>
               <a:rPr lang="en-US" sz="1200" dirty="0" smtClean="0">
                 <a:solidFill>
-                  <a:srgbClr val="FFC000"/>
+                  <a:schemeClr val="tx2"/>
                 </a:solidFill>
               </a:rPr>
               <a:t>Slave translator</a:t>
             </a:r>
             <a:endParaRPr lang="en-US" sz="1200" dirty="0">
               <a:solidFill>
-                <a:srgbClr val="FFC000"/>
+                <a:schemeClr val="tx2"/>
               </a:solidFill>
             </a:endParaRPr>
           </a:p>
@@ -3599,7 +3590,7 @@
         </p:nvSpPr>
         <p:spPr>
           <a:xfrm>
-            <a:off x="3124200" y="3048000"/>
+            <a:off x="3276600" y="3352800"/>
             <a:ext cx="3429000" cy="1676400"/>
           </a:xfrm>
           <a:prstGeom prst="roundRect">
@@ -3681,7 +3672,7 @@
         </p:nvSpPr>
         <p:spPr>
           <a:xfrm>
-            <a:off x="1219200" y="4114800"/>
+            <a:off x="1371600" y="4419600"/>
             <a:ext cx="1828800" cy="533400"/>
           </a:xfrm>
           <a:prstGeom prst="roundRect">
@@ -3747,7 +3738,7 @@
         </p:nvSpPr>
         <p:spPr>
           <a:xfrm>
-            <a:off x="3429000" y="3429000"/>
+            <a:off x="3581400" y="3733800"/>
             <a:ext cx="1600200" cy="381000"/>
           </a:xfrm>
           <a:prstGeom prst="roundRect">
@@ -3784,14 +3775,14 @@
             <a:r>
               <a:rPr lang="en-US" sz="1200" dirty="0" smtClean="0">
                 <a:solidFill>
-                  <a:srgbClr val="FFC000"/>
+                  <a:schemeClr val="tx1"/>
                 </a:solidFill>
               </a:rPr>
               <a:t>(L1_cache)L1_cache.v</a:t>
             </a:r>
             <a:endParaRPr lang="en-US" sz="1200" dirty="0">
               <a:solidFill>
-                <a:srgbClr val="FFC000"/>
+                <a:schemeClr val="tx1"/>
               </a:solidFill>
             </a:endParaRPr>
           </a:p>
@@ -3805,7 +3796,7 @@
         </p:nvSpPr>
         <p:spPr>
           <a:xfrm>
-            <a:off x="3429000" y="4038600"/>
+            <a:off x="3581400" y="4343400"/>
             <a:ext cx="1600200" cy="381000"/>
           </a:xfrm>
           <a:prstGeom prst="roundRect">
@@ -3842,14 +3833,14 @@
             <a:r>
               <a:rPr lang="en-US" sz="1200" dirty="0" smtClean="0">
                 <a:solidFill>
-                  <a:srgbClr val="FFC000"/>
+                  <a:schemeClr val="tx1"/>
                 </a:solidFill>
               </a:rPr>
               <a:t>(L2_cache)L2_cache.v</a:t>
             </a:r>
             <a:endParaRPr lang="en-US" sz="1200" dirty="0">
               <a:solidFill>
-                <a:srgbClr val="FFC000"/>
+                <a:schemeClr val="tx1"/>
               </a:solidFill>
             </a:endParaRPr>
           </a:p>
@@ -3863,7 +3854,7 @@
         </p:nvSpPr>
         <p:spPr>
           <a:xfrm>
-            <a:off x="5105400" y="3733800"/>
+            <a:off x="5257800" y="4038600"/>
             <a:ext cx="1447800" cy="381000"/>
           </a:xfrm>
           <a:prstGeom prst="roundRect">
@@ -3900,16 +3891,84 @@
             <a:r>
               <a:rPr lang="en-US" sz="1200" dirty="0" smtClean="0">
                 <a:solidFill>
-                  <a:srgbClr val="FFC000"/>
+                  <a:schemeClr val="tx1"/>
                 </a:solidFill>
               </a:rPr>
               <a:t>(Arbiter1)Arbiter1.v </a:t>
             </a:r>
             <a:endParaRPr lang="en-US" sz="1200" dirty="0">
               <a:solidFill>
-                <a:srgbClr val="FFC000"/>
+                <a:schemeClr val="tx1"/>
               </a:solidFill>
             </a:endParaRPr>
+          </a:p>
+        </p:txBody>
+      </p:sp>
+      <p:sp>
+        <p:nvSpPr>
+          <p:cNvPr id="132" name="Right Brace 131"/>
+          <p:cNvSpPr/>
+          <p:nvPr/>
+        </p:nvSpPr>
+        <p:spPr>
+          <a:xfrm>
+            <a:off x="7239000" y="2971800"/>
+            <a:ext cx="533400" cy="2133600"/>
+          </a:xfrm>
+          <a:prstGeom prst="rightBrace">
+            <a:avLst/>
+          </a:prstGeom>
+        </p:spPr>
+        <p:style>
+          <a:lnRef idx="1">
+            <a:schemeClr val="accent1"/>
+          </a:lnRef>
+          <a:fillRef idx="0">
+            <a:schemeClr val="accent1"/>
+          </a:fillRef>
+          <a:effectRef idx="0">
+            <a:schemeClr val="accent1"/>
+          </a:effectRef>
+          <a:fontRef idx="minor">
+            <a:schemeClr val="tx1"/>
+          </a:fontRef>
+        </p:style>
+        <p:txBody>
+          <a:bodyPr rtlCol="0" anchor="ctr"/>
+          <a:lstStyle/>
+          <a:p>
+            <a:pPr algn="ctr"/>
+            <a:endParaRPr lang="en-US"/>
+          </a:p>
+        </p:txBody>
+      </p:sp>
+      <p:sp>
+        <p:nvSpPr>
+          <p:cNvPr id="133" name="TextBox 132"/>
+          <p:cNvSpPr txBox="1"/>
+          <p:nvPr/>
+        </p:nvSpPr>
+        <p:spPr>
+          <a:xfrm>
+            <a:off x="7924800" y="3886200"/>
+            <a:ext cx="1066800" cy="276999"/>
+          </a:xfrm>
+          <a:prstGeom prst="rect">
+            <a:avLst/>
+          </a:prstGeom>
+          <a:noFill/>
+        </p:spPr>
+        <p:txBody>
+          <a:bodyPr wrap="square" rtlCol="0">
+            <a:spAutoFit/>
+          </a:bodyPr>
+          <a:lstStyle/>
+          <a:p>
+            <a:r>
+              <a:rPr lang="en-US" sz="1200" dirty="0" smtClean="0"/>
+              <a:t>all our code</a:t>
+            </a:r>
+            <a:endParaRPr lang="en-US" sz="1200" dirty="0"/>
           </a:p>
         </p:txBody>
       </p:sp>

</xml_diff>